<commit_message>
feature/#issue62. Added "Possible Solution" section, updated "Problem description", updated use-case diagram
</commit_message>
<xml_diff>
--- a/docs/presentation/GroupStudy-presentation.pptx
+++ b/docs/presentation/GroupStudy-presentation.pptx
@@ -5,12 +5,13 @@
     <p:sldMasterId id="2147483648" r:id="rId1"/>
   </p:sldMasterIdLst>
   <p:notesMasterIdLst>
-    <p:notesMasterId r:id="rId5"/>
+    <p:notesMasterId r:id="rId6"/>
   </p:notesMasterIdLst>
   <p:sldIdLst>
     <p:sldId id="256" r:id="rId2"/>
     <p:sldId id="257" r:id="rId3"/>
-    <p:sldId id="258" r:id="rId4"/>
+    <p:sldId id="259" r:id="rId4"/>
+    <p:sldId id="258" r:id="rId5"/>
   </p:sldIdLst>
   <p:sldSz cx="9144000" cy="6858000" type="screen4x3"/>
   <p:notesSz cx="6858000" cy="9144000"/>
@@ -3491,12 +3492,20 @@
               <a:t>Group </a:t>
             </a:r>
             <a:r>
+              <a:rPr lang="en-US" sz="1000" dirty="0" smtClean="0">
+                <a:solidFill>
+                  <a:schemeClr val="bg1"/>
+                </a:solidFill>
+              </a:rPr>
+              <a:t>S</a:t>
+            </a:r>
+            <a:r>
               <a:rPr lang="de-DE" sz="1000" dirty="0" err="1" smtClean="0">
                 <a:solidFill>
                   <a:schemeClr val="bg1"/>
                 </a:solidFill>
               </a:rPr>
-              <a:t>study</a:t>
+              <a:t>tudy</a:t>
             </a:r>
             <a:r>
               <a:rPr lang="de-DE" sz="1000" dirty="0" smtClean="0">
@@ -3512,7 +3521,7 @@
                   <a:schemeClr val="bg1"/>
                 </a:solidFill>
               </a:rPr>
-              <a:t>presentaton</a:t>
+              <a:t>Presentation</a:t>
             </a:r>
             <a:endParaRPr lang="de-DE" sz="1000" dirty="0" smtClean="0">
               <a:solidFill>
@@ -4926,6 +4935,119 @@
 </file>
 
 <file path=ppt/slides/slide3.xml><?xml version="1.0" encoding="utf-8"?>
+<p:sld xmlns:a="http://schemas.openxmlformats.org/drawingml/2006/main" xmlns:r="http://schemas.openxmlformats.org/officeDocument/2006/relationships" xmlns:p="http://schemas.openxmlformats.org/presentationml/2006/main">
+  <p:cSld>
+    <p:spTree>
+      <p:nvGrpSpPr>
+        <p:cNvPr id="1" name=""/>
+        <p:cNvGrpSpPr/>
+        <p:nvPr/>
+      </p:nvGrpSpPr>
+      <p:grpSpPr>
+        <a:xfrm>
+          <a:off x="0" y="0"/>
+          <a:ext cx="0" cy="0"/>
+          <a:chOff x="0" y="0"/>
+          <a:chExt cx="0" cy="0"/>
+        </a:xfrm>
+      </p:grpSpPr>
+      <p:sp>
+        <p:nvSpPr>
+          <p:cNvPr id="2" name="Заголовок 1"/>
+          <p:cNvSpPr>
+            <a:spLocks noGrp="1"/>
+          </p:cNvSpPr>
+          <p:nvPr>
+            <p:ph type="title"/>
+          </p:nvPr>
+        </p:nvSpPr>
+        <p:spPr/>
+        <p:txBody>
+          <a:bodyPr/>
+          <a:lstStyle/>
+          <a:p>
+            <a:r>
+              <a:rPr lang="en-US" dirty="0" smtClean="0"/>
+              <a:t>A general use-case for possible solution</a:t>
+            </a:r>
+            <a:endParaRPr lang="en-US" dirty="0"/>
+          </a:p>
+        </p:txBody>
+      </p:sp>
+      <p:pic>
+        <p:nvPicPr>
+          <p:cNvPr id="6" name="Объект 5"/>
+          <p:cNvPicPr>
+            <a:picLocks noGrp="1" noChangeAspect="1"/>
+          </p:cNvPicPr>
+          <p:nvPr>
+            <p:ph idx="1"/>
+          </p:nvPr>
+        </p:nvPicPr>
+        <p:blipFill>
+          <a:blip r:embed="rId2">
+            <a:extLst>
+              <a:ext uri="{28A0092B-C50C-407E-A947-70E740481C1C}">
+                <a14:useLocalDpi xmlns:a14="http://schemas.microsoft.com/office/drawing/2010/main" val="0"/>
+              </a:ext>
+            </a:extLst>
+          </a:blip>
+          <a:stretch>
+            <a:fillRect/>
+          </a:stretch>
+        </p:blipFill>
+        <p:spPr>
+          <a:xfrm>
+            <a:off x="1547664" y="1052736"/>
+            <a:ext cx="6588061" cy="4531508"/>
+          </a:xfrm>
+        </p:spPr>
+      </p:pic>
+      <p:sp>
+        <p:nvSpPr>
+          <p:cNvPr id="7" name="TextBox 6"/>
+          <p:cNvSpPr txBox="1"/>
+          <p:nvPr/>
+        </p:nvSpPr>
+        <p:spPr>
+          <a:xfrm>
+            <a:off x="2160686" y="5584824"/>
+            <a:ext cx="4463081" cy="261610"/>
+          </a:xfrm>
+          <a:prstGeom prst="rect">
+            <a:avLst/>
+          </a:prstGeom>
+          <a:noFill/>
+        </p:spPr>
+        <p:txBody>
+          <a:bodyPr wrap="none" rtlCol="0">
+            <a:spAutoFit/>
+          </a:bodyPr>
+          <a:lstStyle/>
+          <a:p>
+            <a:pPr algn="ctr"/>
+            <a:r>
+              <a:rPr lang="en-US" sz="1100" dirty="0" smtClean="0"/>
+              <a:t>A generalized use-case for a placement algorithm experimental framework</a:t>
+            </a:r>
+            <a:endParaRPr lang="en-US" sz="1100" dirty="0"/>
+          </a:p>
+        </p:txBody>
+      </p:sp>
+    </p:spTree>
+    <p:extLst>
+      <p:ext uri="{BB962C8B-B14F-4D97-AF65-F5344CB8AC3E}">
+        <p14:creationId xmlns:p14="http://schemas.microsoft.com/office/powerpoint/2010/main" val="96474150"/>
+      </p:ext>
+    </p:extLst>
+  </p:cSld>
+  <p:clrMapOvr>
+    <a:masterClrMapping/>
+  </p:clrMapOvr>
+</p:sld>
+</file>
+
+<file path=ppt/slides/slide4.xml><?xml version="1.0" encoding="utf-8"?>
 <p:sld xmlns:a="http://schemas.openxmlformats.org/drawingml/2006/main" xmlns:r="http://schemas.openxmlformats.org/officeDocument/2006/relationships" xmlns:p="http://schemas.openxmlformats.org/presentationml/2006/main">
   <p:cSld>
     <p:spTree>

</xml_diff>

<commit_message>
added speech for Result of experiment
</commit_message>
<xml_diff>
--- a/docs/presentation/GroupStudy-presentation.pptx
+++ b/docs/presentation/GroupStudy-presentation.pptx
@@ -5415,14 +5415,14 @@
           <p:nvPr>
             <p:extLst>
               <p:ext uri="{D42A27DB-BD31-4B8C-83A1-F6EECF244321}">
-                <p14:modId xmlns:p14="http://schemas.microsoft.com/office/powerpoint/2010/main" val="2706890899"/>
+                <p14:modId xmlns:p14="http://schemas.microsoft.com/office/powerpoint/2010/main" val="291185162"/>
               </p:ext>
             </p:extLst>
           </p:nvPr>
         </p:nvGraphicFramePr>
         <p:xfrm>
-          <a:off x="827583" y="1966257"/>
-          <a:ext cx="7992889" cy="3456870"/>
+          <a:off x="827583" y="1966255"/>
+          <a:ext cx="7992889" cy="3839008"/>
         </p:xfrm>
         <a:graphic>
           <a:graphicData uri="http://schemas.openxmlformats.org/drawingml/2006/table">
@@ -5453,7 +5453,7 @@
                   </a:extLst>
                 </a:gridCol>
               </a:tblGrid>
-              <a:tr h="676875">
+              <a:tr h="751700">
                 <a:tc>
                   <a:txBody>
                     <a:bodyPr/>
@@ -5498,7 +5498,7 @@
                   </a:ext>
                 </a:extLst>
               </a:tr>
-              <a:tr h="676875">
+              <a:tr h="778536">
                 <a:tc rowSpan="2">
                   <a:txBody>
                     <a:bodyPr/>
@@ -5557,7 +5557,7 @@
                   </a:ext>
                 </a:extLst>
               </a:tr>
-              <a:tr h="676875">
+              <a:tr h="778536">
                 <a:tc vMerge="1">
                   <a:txBody>
                     <a:bodyPr/>
@@ -5605,7 +5605,7 @@
                   </a:ext>
                 </a:extLst>
               </a:tr>
-              <a:tr h="676875">
+              <a:tr h="751700">
                 <a:tc rowSpan="2">
                   <a:txBody>
                     <a:bodyPr/>
@@ -5662,7 +5662,7 @@
                   </a:ext>
                 </a:extLst>
               </a:tr>
-              <a:tr h="676875">
+              <a:tr h="778536">
                 <a:tc vMerge="1">
                   <a:txBody>
                     <a:bodyPr/>
@@ -5682,7 +5682,6 @@
                         <a:rPr lang="en-US" sz="2000" dirty="0" smtClean="0"/>
                         <a:t>Stability / Performance / Usability</a:t>
                       </a:r>
-                      <a:endParaRPr lang="en-US" sz="2000" dirty="0" smtClean="0"/>
                     </a:p>
                   </a:txBody>
                   <a:tcPr/>

</xml_diff>

<commit_message>
added appendix to presentation
</commit_message>
<xml_diff>
--- a/docs/presentation/GroupStudy-presentation.pptx
+++ b/docs/presentation/GroupStudy-presentation.pptx
@@ -5,7 +5,7 @@
     <p:sldMasterId id="2147483648" r:id="rId1"/>
   </p:sldMasterIdLst>
   <p:notesMasterIdLst>
-    <p:notesMasterId r:id="rId10"/>
+    <p:notesMasterId r:id="rId15"/>
   </p:notesMasterIdLst>
   <p:sldIdLst>
     <p:sldId id="256" r:id="rId2"/>
@@ -16,6 +16,11 @@
     <p:sldId id="258" r:id="rId7"/>
     <p:sldId id="263" r:id="rId8"/>
     <p:sldId id="264" r:id="rId9"/>
+    <p:sldId id="265" r:id="rId10"/>
+    <p:sldId id="266" r:id="rId11"/>
+    <p:sldId id="267" r:id="rId12"/>
+    <p:sldId id="269" r:id="rId13"/>
+    <p:sldId id="268" r:id="rId14"/>
   </p:sldIdLst>
   <p:sldSz cx="9144000" cy="6858000" type="screen4x3"/>
   <p:notesSz cx="6858000" cy="9144000"/>
@@ -4884,6 +4889,462 @@
     <p:extLst>
       <p:ext uri="{BB962C8B-B14F-4D97-AF65-F5344CB8AC3E}">
         <p14:creationId xmlns:p14="http://schemas.microsoft.com/office/powerpoint/2010/main" val="1567677578"/>
+      </p:ext>
+    </p:extLst>
+  </p:cSld>
+  <p:clrMapOvr>
+    <a:masterClrMapping/>
+  </p:clrMapOvr>
+  <p:timing>
+    <p:tnLst>
+      <p:par>
+        <p:cTn id="1" dur="indefinite" restart="never" nodeType="tmRoot"/>
+      </p:par>
+    </p:tnLst>
+  </p:timing>
+</p:sld>
+</file>
+
+<file path=ppt/slides/slide10.xml><?xml version="1.0" encoding="utf-8"?>
+<p:sld xmlns:a="http://schemas.openxmlformats.org/drawingml/2006/main" xmlns:r="http://schemas.openxmlformats.org/officeDocument/2006/relationships" xmlns:p="http://schemas.openxmlformats.org/presentationml/2006/main">
+  <p:cSld>
+    <p:spTree>
+      <p:nvGrpSpPr>
+        <p:cNvPr id="1" name=""/>
+        <p:cNvGrpSpPr/>
+        <p:nvPr/>
+      </p:nvGrpSpPr>
+      <p:grpSpPr>
+        <a:xfrm>
+          <a:off x="0" y="0"/>
+          <a:ext cx="0" cy="0"/>
+          <a:chOff x="0" y="0"/>
+          <a:chExt cx="0" cy="0"/>
+        </a:xfrm>
+      </p:grpSpPr>
+      <p:sp>
+        <p:nvSpPr>
+          <p:cNvPr id="2" name="Заголовок 1"/>
+          <p:cNvSpPr>
+            <a:spLocks noGrp="1"/>
+          </p:cNvSpPr>
+          <p:nvPr>
+            <p:ph type="title"/>
+          </p:nvPr>
+        </p:nvSpPr>
+        <p:spPr>
+          <a:xfrm>
+            <a:off x="611560" y="0"/>
+            <a:ext cx="8229600" cy="562074"/>
+          </a:xfrm>
+        </p:spPr>
+        <p:txBody>
+          <a:bodyPr/>
+          <a:lstStyle/>
+          <a:p>
+            <a:r>
+              <a:rPr lang="en-US" dirty="0" smtClean="0"/>
+              <a:t>Appendix. </a:t>
+            </a:r>
+            <a:r>
+              <a:rPr lang="en-US" dirty="0" smtClean="0"/>
+              <a:t>Experiment 3/6</a:t>
+            </a:r>
+            <a:endParaRPr lang="ru-RU" dirty="0"/>
+          </a:p>
+        </p:txBody>
+      </p:sp>
+      <p:pic>
+        <p:nvPicPr>
+          <p:cNvPr id="4" name="Рисунок 3"/>
+          <p:cNvPicPr>
+            <a:picLocks noChangeAspect="1"/>
+          </p:cNvPicPr>
+          <p:nvPr/>
+        </p:nvPicPr>
+        <p:blipFill>
+          <a:blip r:embed="rId2">
+            <a:extLst>
+              <a:ext uri="{28A0092B-C50C-407E-A947-70E740481C1C}">
+                <a14:useLocalDpi xmlns:a14="http://schemas.microsoft.com/office/drawing/2010/main" val="0"/>
+              </a:ext>
+            </a:extLst>
+          </a:blip>
+          <a:stretch>
+            <a:fillRect/>
+          </a:stretch>
+        </p:blipFill>
+        <p:spPr>
+          <a:xfrm>
+            <a:off x="1547664" y="506707"/>
+            <a:ext cx="6476442" cy="5551236"/>
+          </a:xfrm>
+          <a:prstGeom prst="rect">
+            <a:avLst/>
+          </a:prstGeom>
+        </p:spPr>
+      </p:pic>
+    </p:spTree>
+    <p:extLst>
+      <p:ext uri="{BB962C8B-B14F-4D97-AF65-F5344CB8AC3E}">
+        <p14:creationId xmlns:p14="http://schemas.microsoft.com/office/powerpoint/2010/main" val="1621253049"/>
+      </p:ext>
+    </p:extLst>
+  </p:cSld>
+  <p:clrMapOvr>
+    <a:masterClrMapping/>
+  </p:clrMapOvr>
+  <p:timing>
+    <p:tnLst>
+      <p:par>
+        <p:cTn id="1" dur="indefinite" restart="never" nodeType="tmRoot"/>
+      </p:par>
+    </p:tnLst>
+  </p:timing>
+</p:sld>
+</file>
+
+<file path=ppt/slides/slide11.xml><?xml version="1.0" encoding="utf-8"?>
+<p:sld xmlns:a="http://schemas.openxmlformats.org/drawingml/2006/main" xmlns:r="http://schemas.openxmlformats.org/officeDocument/2006/relationships" xmlns:p="http://schemas.openxmlformats.org/presentationml/2006/main">
+  <p:cSld>
+    <p:spTree>
+      <p:nvGrpSpPr>
+        <p:cNvPr id="1" name=""/>
+        <p:cNvGrpSpPr/>
+        <p:nvPr/>
+      </p:nvGrpSpPr>
+      <p:grpSpPr>
+        <a:xfrm>
+          <a:off x="0" y="0"/>
+          <a:ext cx="0" cy="0"/>
+          <a:chOff x="0" y="0"/>
+          <a:chExt cx="0" cy="0"/>
+        </a:xfrm>
+      </p:grpSpPr>
+      <p:sp>
+        <p:nvSpPr>
+          <p:cNvPr id="2" name="Заголовок 1"/>
+          <p:cNvSpPr>
+            <a:spLocks noGrp="1"/>
+          </p:cNvSpPr>
+          <p:nvPr>
+            <p:ph type="title"/>
+          </p:nvPr>
+        </p:nvSpPr>
+        <p:spPr>
+          <a:xfrm>
+            <a:off x="611560" y="0"/>
+            <a:ext cx="8229600" cy="562074"/>
+          </a:xfrm>
+        </p:spPr>
+        <p:txBody>
+          <a:bodyPr/>
+          <a:lstStyle/>
+          <a:p>
+            <a:r>
+              <a:rPr lang="en-US" dirty="0" smtClean="0"/>
+              <a:t>Appendix. </a:t>
+            </a:r>
+            <a:r>
+              <a:rPr lang="en-US" dirty="0" smtClean="0"/>
+              <a:t>Experiment 4/6</a:t>
+            </a:r>
+            <a:endParaRPr lang="ru-RU" dirty="0"/>
+          </a:p>
+        </p:txBody>
+      </p:sp>
+      <p:pic>
+        <p:nvPicPr>
+          <p:cNvPr id="3" name="Рисунок 2"/>
+          <p:cNvPicPr>
+            <a:picLocks noChangeAspect="1"/>
+          </p:cNvPicPr>
+          <p:nvPr/>
+        </p:nvPicPr>
+        <p:blipFill>
+          <a:blip r:embed="rId2">
+            <a:extLst>
+              <a:ext uri="{28A0092B-C50C-407E-A947-70E740481C1C}">
+                <a14:useLocalDpi xmlns:a14="http://schemas.microsoft.com/office/drawing/2010/main" val="0"/>
+              </a:ext>
+            </a:extLst>
+          </a:blip>
+          <a:stretch>
+            <a:fillRect/>
+          </a:stretch>
+        </p:blipFill>
+        <p:spPr>
+          <a:xfrm>
+            <a:off x="1475656" y="531512"/>
+            <a:ext cx="6465751" cy="5542072"/>
+          </a:xfrm>
+          <a:prstGeom prst="rect">
+            <a:avLst/>
+          </a:prstGeom>
+        </p:spPr>
+      </p:pic>
+    </p:spTree>
+    <p:extLst>
+      <p:ext uri="{BB962C8B-B14F-4D97-AF65-F5344CB8AC3E}">
+        <p14:creationId xmlns:p14="http://schemas.microsoft.com/office/powerpoint/2010/main" val="712066482"/>
+      </p:ext>
+    </p:extLst>
+  </p:cSld>
+  <p:clrMapOvr>
+    <a:masterClrMapping/>
+  </p:clrMapOvr>
+  <p:timing>
+    <p:tnLst>
+      <p:par>
+        <p:cTn id="1" dur="indefinite" restart="never" nodeType="tmRoot"/>
+      </p:par>
+    </p:tnLst>
+  </p:timing>
+</p:sld>
+</file>
+
+<file path=ppt/slides/slide12.xml><?xml version="1.0" encoding="utf-8"?>
+<p:sld xmlns:a="http://schemas.openxmlformats.org/drawingml/2006/main" xmlns:r="http://schemas.openxmlformats.org/officeDocument/2006/relationships" xmlns:p="http://schemas.openxmlformats.org/presentationml/2006/main">
+  <p:cSld>
+    <p:spTree>
+      <p:nvGrpSpPr>
+        <p:cNvPr id="1" name=""/>
+        <p:cNvGrpSpPr/>
+        <p:nvPr/>
+      </p:nvGrpSpPr>
+      <p:grpSpPr>
+        <a:xfrm>
+          <a:off x="0" y="0"/>
+          <a:ext cx="0" cy="0"/>
+          <a:chOff x="0" y="0"/>
+          <a:chExt cx="0" cy="0"/>
+        </a:xfrm>
+      </p:grpSpPr>
+      <p:sp>
+        <p:nvSpPr>
+          <p:cNvPr id="2" name="Заголовок 1"/>
+          <p:cNvSpPr>
+            <a:spLocks noGrp="1"/>
+          </p:cNvSpPr>
+          <p:nvPr>
+            <p:ph type="title"/>
+          </p:nvPr>
+        </p:nvSpPr>
+        <p:spPr>
+          <a:xfrm>
+            <a:off x="611560" y="0"/>
+            <a:ext cx="8229600" cy="562074"/>
+          </a:xfrm>
+        </p:spPr>
+        <p:txBody>
+          <a:bodyPr/>
+          <a:lstStyle/>
+          <a:p>
+            <a:r>
+              <a:rPr lang="en-US" dirty="0" smtClean="0"/>
+              <a:t>Appendix. </a:t>
+            </a:r>
+            <a:r>
+              <a:rPr lang="en-US" dirty="0" smtClean="0"/>
+              <a:t>Experiment 5/6</a:t>
+            </a:r>
+            <a:endParaRPr lang="ru-RU" dirty="0"/>
+          </a:p>
+        </p:txBody>
+      </p:sp>
+      <p:pic>
+        <p:nvPicPr>
+          <p:cNvPr id="4" name="Рисунок 3"/>
+          <p:cNvPicPr>
+            <a:picLocks noChangeAspect="1"/>
+          </p:cNvPicPr>
+          <p:nvPr/>
+        </p:nvPicPr>
+        <p:blipFill>
+          <a:blip r:embed="rId2">
+            <a:extLst>
+              <a:ext uri="{28A0092B-C50C-407E-A947-70E740481C1C}">
+                <a14:useLocalDpi xmlns:a14="http://schemas.microsoft.com/office/drawing/2010/main" val="0"/>
+              </a:ext>
+            </a:extLst>
+          </a:blip>
+          <a:stretch>
+            <a:fillRect/>
+          </a:stretch>
+        </p:blipFill>
+        <p:spPr>
+          <a:xfrm>
+            <a:off x="1547664" y="476672"/>
+            <a:ext cx="6490827" cy="5563566"/>
+          </a:xfrm>
+          <a:prstGeom prst="rect">
+            <a:avLst/>
+          </a:prstGeom>
+        </p:spPr>
+      </p:pic>
+    </p:spTree>
+    <p:extLst>
+      <p:ext uri="{BB962C8B-B14F-4D97-AF65-F5344CB8AC3E}">
+        <p14:creationId xmlns:p14="http://schemas.microsoft.com/office/powerpoint/2010/main" val="591307956"/>
+      </p:ext>
+    </p:extLst>
+  </p:cSld>
+  <p:clrMapOvr>
+    <a:masterClrMapping/>
+  </p:clrMapOvr>
+  <p:timing>
+    <p:tnLst>
+      <p:par>
+        <p:cTn id="1" dur="indefinite" restart="never" nodeType="tmRoot"/>
+      </p:par>
+    </p:tnLst>
+  </p:timing>
+</p:sld>
+</file>
+
+<file path=ppt/slides/slide13.xml><?xml version="1.0" encoding="utf-8"?>
+<p:sld xmlns:a="http://schemas.openxmlformats.org/drawingml/2006/main" xmlns:r="http://schemas.openxmlformats.org/officeDocument/2006/relationships" xmlns:p="http://schemas.openxmlformats.org/presentationml/2006/main">
+  <p:cSld>
+    <p:spTree>
+      <p:nvGrpSpPr>
+        <p:cNvPr id="1" name=""/>
+        <p:cNvGrpSpPr/>
+        <p:nvPr/>
+      </p:nvGrpSpPr>
+      <p:grpSpPr>
+        <a:xfrm>
+          <a:off x="0" y="0"/>
+          <a:ext cx="0" cy="0"/>
+          <a:chOff x="0" y="0"/>
+          <a:chExt cx="0" cy="0"/>
+        </a:xfrm>
+      </p:grpSpPr>
+      <p:sp>
+        <p:nvSpPr>
+          <p:cNvPr id="2" name="Заголовок 1"/>
+          <p:cNvSpPr>
+            <a:spLocks noGrp="1"/>
+          </p:cNvSpPr>
+          <p:nvPr>
+            <p:ph type="title"/>
+          </p:nvPr>
+        </p:nvSpPr>
+        <p:spPr>
+          <a:xfrm>
+            <a:off x="611560" y="0"/>
+            <a:ext cx="8229600" cy="562074"/>
+          </a:xfrm>
+        </p:spPr>
+        <p:txBody>
+          <a:bodyPr/>
+          <a:lstStyle/>
+          <a:p>
+            <a:r>
+              <a:rPr lang="en-US" dirty="0" smtClean="0"/>
+              <a:t>Appendix. </a:t>
+            </a:r>
+            <a:r>
+              <a:rPr lang="en-US" dirty="0" smtClean="0"/>
+              <a:t>Experiment 6/6</a:t>
+            </a:r>
+            <a:endParaRPr lang="ru-RU" dirty="0"/>
+          </a:p>
+        </p:txBody>
+      </p:sp>
+      <p:pic>
+        <p:nvPicPr>
+          <p:cNvPr id="5" name="Рисунок 4"/>
+          <p:cNvPicPr>
+            <a:picLocks noChangeAspect="1"/>
+          </p:cNvPicPr>
+          <p:nvPr/>
+        </p:nvPicPr>
+        <p:blipFill>
+          <a:blip r:embed="rId2" cstate="print">
+            <a:extLst>
+              <a:ext uri="{28A0092B-C50C-407E-A947-70E740481C1C}">
+                <a14:useLocalDpi xmlns:a14="http://schemas.microsoft.com/office/drawing/2010/main" val="0"/>
+              </a:ext>
+            </a:extLst>
+          </a:blip>
+          <a:stretch>
+            <a:fillRect/>
+          </a:stretch>
+        </p:blipFill>
+        <p:spPr>
+          <a:xfrm>
+            <a:off x="6379677" y="836712"/>
+            <a:ext cx="3066585" cy="5269748"/>
+          </a:xfrm>
+          <a:prstGeom prst="rect">
+            <a:avLst/>
+          </a:prstGeom>
+        </p:spPr>
+      </p:pic>
+      <p:pic>
+        <p:nvPicPr>
+          <p:cNvPr id="7" name="Рисунок 6"/>
+          <p:cNvPicPr>
+            <a:picLocks noChangeAspect="1"/>
+          </p:cNvPicPr>
+          <p:nvPr/>
+        </p:nvPicPr>
+        <p:blipFill>
+          <a:blip r:embed="rId3" cstate="print">
+            <a:extLst>
+              <a:ext uri="{28A0092B-C50C-407E-A947-70E740481C1C}">
+                <a14:useLocalDpi xmlns:a14="http://schemas.microsoft.com/office/drawing/2010/main" val="0"/>
+              </a:ext>
+            </a:extLst>
+          </a:blip>
+          <a:stretch>
+            <a:fillRect/>
+          </a:stretch>
+        </p:blipFill>
+        <p:spPr>
+          <a:xfrm>
+            <a:off x="467544" y="562074"/>
+            <a:ext cx="5912133" cy="3599402"/>
+          </a:xfrm>
+          <a:prstGeom prst="rect">
+            <a:avLst/>
+          </a:prstGeom>
+        </p:spPr>
+      </p:pic>
+      <p:pic>
+        <p:nvPicPr>
+          <p:cNvPr id="8" name="Рисунок 7"/>
+          <p:cNvPicPr>
+            <a:picLocks noChangeAspect="1"/>
+          </p:cNvPicPr>
+          <p:nvPr/>
+        </p:nvPicPr>
+        <p:blipFill>
+          <a:blip r:embed="rId4" cstate="print">
+            <a:extLst>
+              <a:ext uri="{28A0092B-C50C-407E-A947-70E740481C1C}">
+                <a14:useLocalDpi xmlns:a14="http://schemas.microsoft.com/office/drawing/2010/main" val="0"/>
+              </a:ext>
+            </a:extLst>
+          </a:blip>
+          <a:stretch>
+            <a:fillRect/>
+          </a:stretch>
+        </p:blipFill>
+        <p:spPr>
+          <a:xfrm>
+            <a:off x="1" y="4134638"/>
+            <a:ext cx="6444208" cy="2725458"/>
+          </a:xfrm>
+          <a:prstGeom prst="rect">
+            <a:avLst/>
+          </a:prstGeom>
+        </p:spPr>
+      </p:pic>
+    </p:spTree>
+    <p:extLst>
+      <p:ext uri="{BB962C8B-B14F-4D97-AF65-F5344CB8AC3E}">
+        <p14:creationId xmlns:p14="http://schemas.microsoft.com/office/powerpoint/2010/main" val="2544306504"/>
       </p:ext>
     </p:extLst>
   </p:cSld>
@@ -7055,7 +7516,11 @@
           <a:p>
             <a:r>
               <a:rPr lang="en-US" dirty="0" smtClean="0"/>
-              <a:t>Appendix. Experiment</a:t>
+              <a:t>Appendix. </a:t>
+            </a:r>
+            <a:r>
+              <a:rPr lang="en-US" dirty="0" smtClean="0"/>
+              <a:t>Experiment 1/6</a:t>
             </a:r>
             <a:endParaRPr lang="ru-RU" dirty="0"/>
           </a:p>
@@ -7063,14 +7528,14 @@
       </p:sp>
       <p:pic>
         <p:nvPicPr>
-          <p:cNvPr id="5" name="Рисунок 4"/>
+          <p:cNvPr id="3" name="Рисунок 2"/>
           <p:cNvPicPr>
             <a:picLocks noChangeAspect="1"/>
           </p:cNvPicPr>
           <p:nvPr/>
         </p:nvPicPr>
         <p:blipFill>
-          <a:blip r:embed="rId2" cstate="print">
+          <a:blip r:embed="rId2">
             <a:extLst>
               <a:ext uri="{28A0092B-C50C-407E-A947-70E740481C1C}">
                 <a14:useLocalDpi xmlns:a14="http://schemas.microsoft.com/office/drawing/2010/main" val="0"/>
@@ -7083,8 +7548,8 @@
         </p:blipFill>
         <p:spPr>
           <a:xfrm>
-            <a:off x="6379677" y="836712"/>
-            <a:ext cx="3066585" cy="5269748"/>
+            <a:off x="467545" y="542399"/>
+            <a:ext cx="3013508" cy="2742585"/>
           </a:xfrm>
           <a:prstGeom prst="rect">
             <a:avLst/>
@@ -7093,7 +7558,7 @@
       </p:pic>
       <p:pic>
         <p:nvPicPr>
-          <p:cNvPr id="7" name="Рисунок 6"/>
+          <p:cNvPr id="4" name="Рисунок 3"/>
           <p:cNvPicPr>
             <a:picLocks noChangeAspect="1"/>
           </p:cNvPicPr>
@@ -7113,8 +7578,8 @@
         </p:blipFill>
         <p:spPr>
           <a:xfrm>
-            <a:off x="467544" y="562074"/>
-            <a:ext cx="5912133" cy="3599402"/>
+            <a:off x="3131840" y="3307651"/>
+            <a:ext cx="2953816" cy="2688258"/>
           </a:xfrm>
           <a:prstGeom prst="rect">
             <a:avLst/>
@@ -7123,14 +7588,14 @@
       </p:pic>
       <p:pic>
         <p:nvPicPr>
-          <p:cNvPr id="8" name="Рисунок 7"/>
+          <p:cNvPr id="6" name="Рисунок 5"/>
           <p:cNvPicPr>
             <a:picLocks noChangeAspect="1"/>
           </p:cNvPicPr>
           <p:nvPr/>
         </p:nvPicPr>
         <p:blipFill>
-          <a:blip r:embed="rId4" cstate="print">
+          <a:blip r:embed="rId4">
             <a:extLst>
               <a:ext uri="{28A0092B-C50C-407E-A947-70E740481C1C}">
                 <a14:useLocalDpi xmlns:a14="http://schemas.microsoft.com/office/drawing/2010/main" val="0"/>
@@ -7143,8 +7608,239 @@
         </p:blipFill>
         <p:spPr>
           <a:xfrm>
-            <a:off x="1" y="4134638"/>
-            <a:ext cx="6444208" cy="2725458"/>
+            <a:off x="5508103" y="562074"/>
+            <a:ext cx="3033957" cy="2761195"/>
+          </a:xfrm>
+          <a:prstGeom prst="rect">
+            <a:avLst/>
+          </a:prstGeom>
+        </p:spPr>
+      </p:pic>
+      <p:sp>
+        <p:nvSpPr>
+          <p:cNvPr id="9" name="Объект 2"/>
+          <p:cNvSpPr>
+            <a:spLocks noGrp="1"/>
+          </p:cNvSpPr>
+          <p:nvPr>
+            <p:ph sz="half" idx="1"/>
+          </p:nvPr>
+        </p:nvSpPr>
+        <p:spPr>
+          <a:xfrm>
+            <a:off x="3564632" y="2636912"/>
+            <a:ext cx="2088232" cy="476537"/>
+          </a:xfrm>
+        </p:spPr>
+        <p:txBody>
+          <a:bodyPr>
+            <a:normAutofit/>
+          </a:bodyPr>
+          <a:lstStyle/>
+          <a:p>
+            <a:pPr marL="0" indent="0">
+              <a:buNone/>
+            </a:pPr>
+            <a:r>
+              <a:rPr lang="en-US" dirty="0" smtClean="0"/>
+              <a:t>Near-optimal</a:t>
+            </a:r>
+            <a:endParaRPr lang="ru-RU" dirty="0"/>
+          </a:p>
+        </p:txBody>
+      </p:sp>
+      <p:sp>
+        <p:nvSpPr>
+          <p:cNvPr id="10" name="Объект 2"/>
+          <p:cNvSpPr>
+            <a:spLocks noGrp="1"/>
+          </p:cNvSpPr>
+          <p:nvPr>
+            <p:ph sz="half" idx="1"/>
+          </p:nvPr>
+        </p:nvSpPr>
+        <p:spPr>
+          <a:xfrm>
+            <a:off x="1259631" y="3501008"/>
+            <a:ext cx="1758783" cy="476537"/>
+          </a:xfrm>
+        </p:spPr>
+        <p:txBody>
+          <a:bodyPr>
+            <a:normAutofit/>
+          </a:bodyPr>
+          <a:lstStyle/>
+          <a:p>
+            <a:pPr marL="0" indent="0">
+              <a:buNone/>
+            </a:pPr>
+            <a:r>
+              <a:rPr lang="en-US" dirty="0" smtClean="0"/>
+              <a:t>Uniform</a:t>
+            </a:r>
+            <a:endParaRPr lang="ru-RU" dirty="0"/>
+          </a:p>
+        </p:txBody>
+      </p:sp>
+      <p:sp>
+        <p:nvSpPr>
+          <p:cNvPr id="11" name="Объект 2"/>
+          <p:cNvSpPr>
+            <a:spLocks noGrp="1"/>
+          </p:cNvSpPr>
+          <p:nvPr>
+            <p:ph sz="half" idx="1"/>
+          </p:nvPr>
+        </p:nvSpPr>
+        <p:spPr>
+          <a:xfrm>
+            <a:off x="1259632" y="3501008"/>
+            <a:ext cx="1758783" cy="476537"/>
+          </a:xfrm>
+        </p:spPr>
+        <p:txBody>
+          <a:bodyPr>
+            <a:normAutofit/>
+          </a:bodyPr>
+          <a:lstStyle/>
+          <a:p>
+            <a:pPr marL="0" indent="0">
+              <a:buNone/>
+            </a:pPr>
+            <a:r>
+              <a:rPr lang="en-US" dirty="0" smtClean="0"/>
+              <a:t>Uniform</a:t>
+            </a:r>
+            <a:endParaRPr lang="ru-RU" dirty="0"/>
+          </a:p>
+        </p:txBody>
+      </p:sp>
+      <p:sp>
+        <p:nvSpPr>
+          <p:cNvPr id="12" name="Объект 2"/>
+          <p:cNvSpPr>
+            <a:spLocks noGrp="1"/>
+          </p:cNvSpPr>
+          <p:nvPr>
+            <p:ph sz="half" idx="1"/>
+          </p:nvPr>
+        </p:nvSpPr>
+        <p:spPr>
+          <a:xfrm>
+            <a:off x="6660232" y="3501008"/>
+            <a:ext cx="1800199" cy="576064"/>
+          </a:xfrm>
+        </p:spPr>
+        <p:txBody>
+          <a:bodyPr>
+            <a:normAutofit/>
+          </a:bodyPr>
+          <a:lstStyle/>
+          <a:p>
+            <a:pPr marL="0" indent="0">
+              <a:buNone/>
+            </a:pPr>
+            <a:r>
+              <a:rPr lang="en-US" dirty="0" smtClean="0"/>
+              <a:t>Suboptimal</a:t>
+            </a:r>
+            <a:endParaRPr lang="ru-RU" dirty="0"/>
+          </a:p>
+        </p:txBody>
+      </p:sp>
+    </p:spTree>
+    <p:extLst>
+      <p:ext uri="{BB962C8B-B14F-4D97-AF65-F5344CB8AC3E}">
+        <p14:creationId xmlns:p14="http://schemas.microsoft.com/office/powerpoint/2010/main" val="2066294109"/>
+      </p:ext>
+    </p:extLst>
+  </p:cSld>
+  <p:clrMapOvr>
+    <a:masterClrMapping/>
+  </p:clrMapOvr>
+  <p:timing>
+    <p:tnLst>
+      <p:par>
+        <p:cTn id="1" dur="indefinite" restart="never" nodeType="tmRoot"/>
+      </p:par>
+    </p:tnLst>
+  </p:timing>
+</p:sld>
+</file>
+
+<file path=ppt/slides/slide9.xml><?xml version="1.0" encoding="utf-8"?>
+<p:sld xmlns:a="http://schemas.openxmlformats.org/drawingml/2006/main" xmlns:r="http://schemas.openxmlformats.org/officeDocument/2006/relationships" xmlns:p="http://schemas.openxmlformats.org/presentationml/2006/main">
+  <p:cSld>
+    <p:spTree>
+      <p:nvGrpSpPr>
+        <p:cNvPr id="1" name=""/>
+        <p:cNvGrpSpPr/>
+        <p:nvPr/>
+      </p:nvGrpSpPr>
+      <p:grpSpPr>
+        <a:xfrm>
+          <a:off x="0" y="0"/>
+          <a:ext cx="0" cy="0"/>
+          <a:chOff x="0" y="0"/>
+          <a:chExt cx="0" cy="0"/>
+        </a:xfrm>
+      </p:grpSpPr>
+      <p:sp>
+        <p:nvSpPr>
+          <p:cNvPr id="2" name="Заголовок 1"/>
+          <p:cNvSpPr>
+            <a:spLocks noGrp="1"/>
+          </p:cNvSpPr>
+          <p:nvPr>
+            <p:ph type="title"/>
+          </p:nvPr>
+        </p:nvSpPr>
+        <p:spPr>
+          <a:xfrm>
+            <a:off x="611560" y="0"/>
+            <a:ext cx="8229600" cy="562074"/>
+          </a:xfrm>
+        </p:spPr>
+        <p:txBody>
+          <a:bodyPr/>
+          <a:lstStyle/>
+          <a:p>
+            <a:r>
+              <a:rPr lang="en-US" dirty="0" smtClean="0"/>
+              <a:t>Appendix. </a:t>
+            </a:r>
+            <a:r>
+              <a:rPr lang="en-US" dirty="0" smtClean="0"/>
+              <a:t>Experiment 2/6</a:t>
+            </a:r>
+            <a:endParaRPr lang="ru-RU" dirty="0"/>
+          </a:p>
+        </p:txBody>
+      </p:sp>
+      <p:pic>
+        <p:nvPicPr>
+          <p:cNvPr id="3" name="Рисунок 2"/>
+          <p:cNvPicPr>
+            <a:picLocks noChangeAspect="1"/>
+          </p:cNvPicPr>
+          <p:nvPr/>
+        </p:nvPicPr>
+        <p:blipFill>
+          <a:blip r:embed="rId2">
+            <a:extLst>
+              <a:ext uri="{28A0092B-C50C-407E-A947-70E740481C1C}">
+                <a14:useLocalDpi xmlns:a14="http://schemas.microsoft.com/office/drawing/2010/main" val="0"/>
+              </a:ext>
+            </a:extLst>
+          </a:blip>
+          <a:stretch>
+            <a:fillRect/>
+          </a:stretch>
+        </p:blipFill>
+        <p:spPr>
+          <a:xfrm>
+            <a:off x="1403648" y="476672"/>
+            <a:ext cx="6513099" cy="5582656"/>
           </a:xfrm>
           <a:prstGeom prst="rect">
             <a:avLst/>
@@ -7154,7 +7850,7 @@
     </p:spTree>
     <p:extLst>
       <p:ext uri="{BB962C8B-B14F-4D97-AF65-F5344CB8AC3E}">
-        <p14:creationId xmlns:p14="http://schemas.microsoft.com/office/powerpoint/2010/main" val="2066294109"/>
+        <p14:creationId xmlns:p14="http://schemas.microsoft.com/office/powerpoint/2010/main" val="266616010"/>
       </p:ext>
     </p:extLst>
   </p:cSld>

</xml_diff>